<commit_message>
updated scrum board files with correct user story phrasing
</commit_message>
<xml_diff>
--- a/SE202526/Management/Sprint4/Scrum_Board_Sprint 4.pptx
+++ b/SE202526/Management/Sprint4/Scrum_Board_Sprint 4.pptx
@@ -270,7 +270,7 @@
 <file path=ppt/revisionInfo.xml><?xml version="1.0" encoding="utf-8"?>
 <p1510:revInfo xmlns:a="http://schemas.openxmlformats.org/drawingml/2006/main" xmlns:r="http://schemas.openxmlformats.org/officeDocument/2006/relationships" xmlns:p1510="http://schemas.microsoft.com/office/powerpoint/2015/10/main">
   <p1510:revLst>
-    <p1510:client id="{C3EEEFC6-9EA4-4517-B1F5-B4D7CDDF9AAF}" v="14" dt="2025-11-07T10:29:37.648"/>
+    <p1510:client id="{C3EEEFC6-9EA4-4517-B1F5-B4D7CDDF9AAF}" v="18" dt="2025-11-13T16:40:41.329"/>
   </p1510:revLst>
 </p1510:revInfo>
 </file>
@@ -280,7 +280,7 @@
   <pc:docChgLst>
     <pc:chgData name="Miguel Rosalino" userId="142876607cca7130" providerId="LiveId" clId="{241F22B6-51C7-4BD9-87DD-DF73D06C2F54}"/>
     <pc:docChg chg="undo custSel addSld delSld modSld sldOrd">
-      <pc:chgData name="Miguel Rosalino" userId="142876607cca7130" providerId="LiveId" clId="{241F22B6-51C7-4BD9-87DD-DF73D06C2F54}" dt="2025-11-07T10:30:45.361" v="474" actId="166"/>
+      <pc:chgData name="Miguel Rosalino" userId="142876607cca7130" providerId="LiveId" clId="{241F22B6-51C7-4BD9-87DD-DF73D06C2F54}" dt="2025-11-13T16:40:41.329" v="501"/>
       <pc:docMkLst>
         <pc:docMk/>
       </pc:docMkLst>
@@ -300,25 +300,25 @@
         </pc:spChg>
       </pc:sldChg>
       <pc:sldChg chg="addSp delSp modSp mod ord">
-        <pc:chgData name="Miguel Rosalino" userId="142876607cca7130" providerId="LiveId" clId="{241F22B6-51C7-4BD9-87DD-DF73D06C2F54}" dt="2025-11-07T10:29:11.997" v="391"/>
+        <pc:chgData name="Miguel Rosalino" userId="142876607cca7130" providerId="LiveId" clId="{241F22B6-51C7-4BD9-87DD-DF73D06C2F54}" dt="2025-11-13T16:40:34.189" v="497" actId="20577"/>
         <pc:sldMkLst>
           <pc:docMk/>
           <pc:sldMk cId="2952492342" sldId="271"/>
         </pc:sldMkLst>
+        <pc:spChg chg="mod">
+          <ac:chgData name="Miguel Rosalino" userId="142876607cca7130" providerId="LiveId" clId="{241F22B6-51C7-4BD9-87DD-DF73D06C2F54}" dt="2025-11-13T16:40:34.189" v="497" actId="20577"/>
+          <ac:spMkLst>
+            <pc:docMk/>
+            <pc:sldMk cId="2952492342" sldId="271"/>
+            <ac:spMk id="5" creationId="{8098C960-FCB1-E6C9-566A-1DB5525C240C}"/>
+          </ac:spMkLst>
+        </pc:spChg>
         <pc:spChg chg="mod">
           <ac:chgData name="Miguel Rosalino" userId="142876607cca7130" providerId="LiveId" clId="{241F22B6-51C7-4BD9-87DD-DF73D06C2F54}" dt="2025-11-07T10:29:09.854" v="390" actId="1038"/>
           <ac:spMkLst>
             <pc:docMk/>
             <pc:sldMk cId="2952492342" sldId="271"/>
             <ac:spMk id="7" creationId="{4F7D583C-A2C8-DD42-D239-3D883247C0EA}"/>
-          </ac:spMkLst>
-        </pc:spChg>
-        <pc:spChg chg="del mod">
-          <ac:chgData name="Miguel Rosalino" userId="142876607cca7130" providerId="LiveId" clId="{241F22B6-51C7-4BD9-87DD-DF73D06C2F54}" dt="2025-11-07T10:28:37.750" v="310" actId="478"/>
-          <ac:spMkLst>
-            <pc:docMk/>
-            <pc:sldMk cId="2952492342" sldId="271"/>
-            <ac:spMk id="8" creationId="{B465E629-5EFB-25C0-FE86-860DCEA99BFD}"/>
           </ac:spMkLst>
         </pc:spChg>
         <pc:spChg chg="mod">
@@ -329,22 +329,6 @@
             <ac:spMk id="9" creationId="{5B61E9F2-9E12-E52B-3343-BE899E701A1F}"/>
           </ac:spMkLst>
         </pc:spChg>
-        <pc:spChg chg="add del mod">
-          <ac:chgData name="Miguel Rosalino" userId="142876607cca7130" providerId="LiveId" clId="{241F22B6-51C7-4BD9-87DD-DF73D06C2F54}" dt="2025-11-07T10:28:41.194" v="312" actId="478"/>
-          <ac:spMkLst>
-            <pc:docMk/>
-            <pc:sldMk cId="2952492342" sldId="271"/>
-            <ac:spMk id="10" creationId="{44FEE6C6-DC91-6D7F-91E1-3E5C18211419}"/>
-          </ac:spMkLst>
-        </pc:spChg>
-        <pc:spChg chg="del mod">
-          <ac:chgData name="Miguel Rosalino" userId="142876607cca7130" providerId="LiveId" clId="{241F22B6-51C7-4BD9-87DD-DF73D06C2F54}" dt="2025-11-07T10:28:39.780" v="311" actId="478"/>
-          <ac:spMkLst>
-            <pc:docMk/>
-            <pc:sldMk cId="2952492342" sldId="271"/>
-            <ac:spMk id="11" creationId="{A795FE8B-862C-9793-F732-7485D7AA04D2}"/>
-          </ac:spMkLst>
-        </pc:spChg>
         <pc:spChg chg="mod">
           <ac:chgData name="Miguel Rosalino" userId="142876607cca7130" providerId="LiveId" clId="{241F22B6-51C7-4BD9-87DD-DF73D06C2F54}" dt="2025-11-07T10:29:09.854" v="390" actId="1038"/>
           <ac:spMkLst>
@@ -353,135 +337,21 @@
             <ac:spMk id="12" creationId="{909A9D16-5F73-8C63-470F-DCCD77FC0C03}"/>
           </ac:spMkLst>
         </pc:spChg>
-        <pc:spChg chg="add mod">
-          <ac:chgData name="Miguel Rosalino" userId="142876607cca7130" providerId="LiveId" clId="{241F22B6-51C7-4BD9-87DD-DF73D06C2F54}" dt="2025-11-07T10:29:11.997" v="391"/>
-          <ac:spMkLst>
-            <pc:docMk/>
-            <pc:sldMk cId="2952492342" sldId="271"/>
-            <ac:spMk id="13" creationId="{B719201B-58FA-88C3-E0D0-EC85D1FB7800}"/>
-          </ac:spMkLst>
-        </pc:spChg>
-        <pc:spChg chg="add mod">
-          <ac:chgData name="Miguel Rosalino" userId="142876607cca7130" providerId="LiveId" clId="{241F22B6-51C7-4BD9-87DD-DF73D06C2F54}" dt="2025-11-07T10:29:11.997" v="391"/>
-          <ac:spMkLst>
-            <pc:docMk/>
-            <pc:sldMk cId="2952492342" sldId="271"/>
-            <ac:spMk id="14" creationId="{A2F0057D-6A00-CDDD-22CB-7C80E40858BB}"/>
-          </ac:spMkLst>
-        </pc:spChg>
-        <pc:spChg chg="add mod">
-          <ac:chgData name="Miguel Rosalino" userId="142876607cca7130" providerId="LiveId" clId="{241F22B6-51C7-4BD9-87DD-DF73D06C2F54}" dt="2025-11-07T10:29:11.997" v="391"/>
-          <ac:spMkLst>
-            <pc:docMk/>
-            <pc:sldMk cId="2952492342" sldId="271"/>
-            <ac:spMk id="15" creationId="{B69D4E60-7BDE-3D5D-3EAA-E232C668F5E8}"/>
-          </ac:spMkLst>
-        </pc:spChg>
-        <pc:spChg chg="del">
-          <ac:chgData name="Miguel Rosalino" userId="142876607cca7130" providerId="LiveId" clId="{241F22B6-51C7-4BD9-87DD-DF73D06C2F54}" dt="2025-11-07T10:28:43.198" v="313" actId="478"/>
-          <ac:spMkLst>
-            <pc:docMk/>
-            <pc:sldMk cId="2952492342" sldId="271"/>
-            <ac:spMk id="90" creationId="{E2712A31-AE8E-A156-8193-B4CCF85ADE07}"/>
-          </ac:spMkLst>
-        </pc:spChg>
-      </pc:sldChg>
-      <pc:sldChg chg="modSp add del mod">
-        <pc:chgData name="Miguel Rosalino" userId="142876607cca7130" providerId="LiveId" clId="{241F22B6-51C7-4BD9-87DD-DF73D06C2F54}" dt="2025-11-07T10:28:55.998" v="315" actId="47"/>
-        <pc:sldMkLst>
-          <pc:docMk/>
-          <pc:sldMk cId="3930113259" sldId="272"/>
-        </pc:sldMkLst>
-        <pc:spChg chg="mod">
-          <ac:chgData name="Miguel Rosalino" userId="142876607cca7130" providerId="LiveId" clId="{241F22B6-51C7-4BD9-87DD-DF73D06C2F54}" dt="2025-11-07T10:28:26.435" v="309" actId="1038"/>
-          <ac:spMkLst>
-            <pc:docMk/>
-            <pc:sldMk cId="3930113259" sldId="272"/>
-            <ac:spMk id="7" creationId="{E7DC8B5C-E8F5-FCCF-A4D4-8C9F392F3F60}"/>
-          </ac:spMkLst>
-        </pc:spChg>
-        <pc:spChg chg="mod">
-          <ac:chgData name="Miguel Rosalino" userId="142876607cca7130" providerId="LiveId" clId="{241F22B6-51C7-4BD9-87DD-DF73D06C2F54}" dt="2025-11-07T10:28:26.435" v="309" actId="1038"/>
-          <ac:spMkLst>
-            <pc:docMk/>
-            <pc:sldMk cId="3930113259" sldId="272"/>
-            <ac:spMk id="8" creationId="{43730C42-A009-9D24-EA88-5BC9331FE74C}"/>
-          </ac:spMkLst>
-        </pc:spChg>
-        <pc:spChg chg="mod">
-          <ac:chgData name="Miguel Rosalino" userId="142876607cca7130" providerId="LiveId" clId="{241F22B6-51C7-4BD9-87DD-DF73D06C2F54}" dt="2025-11-07T10:28:26.435" v="309" actId="1038"/>
-          <ac:spMkLst>
-            <pc:docMk/>
-            <pc:sldMk cId="3930113259" sldId="272"/>
-            <ac:spMk id="9" creationId="{FDCE5BD4-45C6-8A09-A023-83F4CD739280}"/>
-          </ac:spMkLst>
-        </pc:spChg>
-        <pc:spChg chg="mod">
-          <ac:chgData name="Miguel Rosalino" userId="142876607cca7130" providerId="LiveId" clId="{241F22B6-51C7-4BD9-87DD-DF73D06C2F54}" dt="2025-11-07T10:28:26.435" v="309" actId="1038"/>
-          <ac:spMkLst>
-            <pc:docMk/>
-            <pc:sldMk cId="3930113259" sldId="272"/>
-            <ac:spMk id="10" creationId="{BA166B5D-4143-F888-DCCC-2F46438A0558}"/>
-          </ac:spMkLst>
-        </pc:spChg>
-        <pc:spChg chg="mod">
-          <ac:chgData name="Miguel Rosalino" userId="142876607cca7130" providerId="LiveId" clId="{241F22B6-51C7-4BD9-87DD-DF73D06C2F54}" dt="2025-11-07T10:28:26.435" v="309" actId="1038"/>
-          <ac:spMkLst>
-            <pc:docMk/>
-            <pc:sldMk cId="3930113259" sldId="272"/>
-            <ac:spMk id="11" creationId="{BECBA5D2-F607-FE83-377F-B122D81C533E}"/>
-          </ac:spMkLst>
-        </pc:spChg>
-        <pc:spChg chg="mod">
-          <ac:chgData name="Miguel Rosalino" userId="142876607cca7130" providerId="LiveId" clId="{241F22B6-51C7-4BD9-87DD-DF73D06C2F54}" dt="2025-11-07T10:28:26.435" v="309" actId="1038"/>
-          <ac:spMkLst>
-            <pc:docMk/>
-            <pc:sldMk cId="3930113259" sldId="272"/>
-            <ac:spMk id="12" creationId="{7BDF2059-448F-C1A9-CC79-A4A6FEC52392}"/>
-          </ac:spMkLst>
-        </pc:spChg>
-      </pc:sldChg>
-      <pc:sldChg chg="add del">
-        <pc:chgData name="Miguel Rosalino" userId="142876607cca7130" providerId="LiveId" clId="{241F22B6-51C7-4BD9-87DD-DF73D06C2F54}" dt="2025-11-07T10:29:30.662" v="450" actId="47"/>
-        <pc:sldMkLst>
-          <pc:docMk/>
-          <pc:sldMk cId="2408479566" sldId="273"/>
-        </pc:sldMkLst>
-      </pc:sldChg>
-      <pc:sldChg chg="add del">
-        <pc:chgData name="Miguel Rosalino" userId="142876607cca7130" providerId="LiveId" clId="{241F22B6-51C7-4BD9-87DD-DF73D06C2F54}" dt="2025-11-07T10:29:31.230" v="451" actId="47"/>
-        <pc:sldMkLst>
-          <pc:docMk/>
-          <pc:sldMk cId="2481068944" sldId="274"/>
-        </pc:sldMkLst>
-      </pc:sldChg>
-      <pc:sldChg chg="add del">
-        <pc:chgData name="Miguel Rosalino" userId="142876607cca7130" providerId="LiveId" clId="{241F22B6-51C7-4BD9-87DD-DF73D06C2F54}" dt="2025-11-07T10:29:31.677" v="452" actId="47"/>
-        <pc:sldMkLst>
-          <pc:docMk/>
-          <pc:sldMk cId="2781914680" sldId="275"/>
-        </pc:sldMkLst>
-      </pc:sldChg>
-      <pc:sldChg chg="add del">
-        <pc:chgData name="Miguel Rosalino" userId="142876607cca7130" providerId="LiveId" clId="{241F22B6-51C7-4BD9-87DD-DF73D06C2F54}" dt="2025-11-07T10:29:32.221" v="453" actId="47"/>
-        <pc:sldMkLst>
-          <pc:docMk/>
-          <pc:sldMk cId="4182286508" sldId="276"/>
-        </pc:sldMkLst>
-      </pc:sldChg>
-      <pc:sldChg chg="add del">
-        <pc:chgData name="Miguel Rosalino" userId="142876607cca7130" providerId="LiveId" clId="{241F22B6-51C7-4BD9-87DD-DF73D06C2F54}" dt="2025-11-07T10:29:32.728" v="454" actId="47"/>
-        <pc:sldMkLst>
-          <pc:docMk/>
-          <pc:sldMk cId="1431218859" sldId="277"/>
-        </pc:sldMkLst>
       </pc:sldChg>
       <pc:sldChg chg="modSp add mod">
-        <pc:chgData name="Miguel Rosalino" userId="142876607cca7130" providerId="LiveId" clId="{241F22B6-51C7-4BD9-87DD-DF73D06C2F54}" dt="2025-11-07T10:29:25.083" v="449" actId="1037"/>
+        <pc:chgData name="Miguel Rosalino" userId="142876607cca7130" providerId="LiveId" clId="{241F22B6-51C7-4BD9-87DD-DF73D06C2F54}" dt="2025-11-13T16:40:36.527" v="498"/>
         <pc:sldMkLst>
           <pc:docMk/>
           <pc:sldMk cId="3509663994" sldId="278"/>
         </pc:sldMkLst>
+        <pc:spChg chg="mod">
+          <ac:chgData name="Miguel Rosalino" userId="142876607cca7130" providerId="LiveId" clId="{241F22B6-51C7-4BD9-87DD-DF73D06C2F54}" dt="2025-11-13T16:40:36.527" v="498"/>
+          <ac:spMkLst>
+            <pc:docMk/>
+            <pc:sldMk cId="3509663994" sldId="278"/>
+            <ac:spMk id="5" creationId="{5327C702-86DE-3004-6F1D-A1BC4FB06891}"/>
+          </ac:spMkLst>
+        </pc:spChg>
         <pc:spChg chg="mod">
           <ac:chgData name="Miguel Rosalino" userId="142876607cca7130" providerId="LiveId" clId="{241F22B6-51C7-4BD9-87DD-DF73D06C2F54}" dt="2025-11-07T10:29:25.083" v="449" actId="1037"/>
           <ac:spMkLst>
@@ -507,19 +377,35 @@
           </ac:spMkLst>
         </pc:spChg>
       </pc:sldChg>
-      <pc:sldChg chg="add">
-        <pc:chgData name="Miguel Rosalino" userId="142876607cca7130" providerId="LiveId" clId="{241F22B6-51C7-4BD9-87DD-DF73D06C2F54}" dt="2025-11-07T10:29:36.098" v="455"/>
+      <pc:sldChg chg="modSp add">
+        <pc:chgData name="Miguel Rosalino" userId="142876607cca7130" providerId="LiveId" clId="{241F22B6-51C7-4BD9-87DD-DF73D06C2F54}" dt="2025-11-13T16:40:38.188" v="499"/>
         <pc:sldMkLst>
           <pc:docMk/>
           <pc:sldMk cId="643236768" sldId="279"/>
         </pc:sldMkLst>
+        <pc:spChg chg="mod">
+          <ac:chgData name="Miguel Rosalino" userId="142876607cca7130" providerId="LiveId" clId="{241F22B6-51C7-4BD9-87DD-DF73D06C2F54}" dt="2025-11-13T16:40:38.188" v="499"/>
+          <ac:spMkLst>
+            <pc:docMk/>
+            <pc:sldMk cId="643236768" sldId="279"/>
+            <ac:spMk id="5" creationId="{D68EAF27-6D27-56AD-6C31-A4E6115854AD}"/>
+          </ac:spMkLst>
+        </pc:spChg>
       </pc:sldChg>
       <pc:sldChg chg="modSp add mod">
-        <pc:chgData name="Miguel Rosalino" userId="142876607cca7130" providerId="LiveId" clId="{241F22B6-51C7-4BD9-87DD-DF73D06C2F54}" dt="2025-11-07T10:29:50.197" v="459" actId="1076"/>
+        <pc:chgData name="Miguel Rosalino" userId="142876607cca7130" providerId="LiveId" clId="{241F22B6-51C7-4BD9-87DD-DF73D06C2F54}" dt="2025-11-13T16:40:39.803" v="500"/>
         <pc:sldMkLst>
           <pc:docMk/>
           <pc:sldMk cId="3243343348" sldId="280"/>
         </pc:sldMkLst>
+        <pc:spChg chg="mod">
+          <ac:chgData name="Miguel Rosalino" userId="142876607cca7130" providerId="LiveId" clId="{241F22B6-51C7-4BD9-87DD-DF73D06C2F54}" dt="2025-11-13T16:40:39.803" v="500"/>
+          <ac:spMkLst>
+            <pc:docMk/>
+            <pc:sldMk cId="3243343348" sldId="280"/>
+            <ac:spMk id="5" creationId="{9721EE7F-805C-B9CF-168E-9973C7CCA1EE}"/>
+          </ac:spMkLst>
+        </pc:spChg>
         <pc:spChg chg="mod">
           <ac:chgData name="Miguel Rosalino" userId="142876607cca7130" providerId="LiveId" clId="{241F22B6-51C7-4BD9-87DD-DF73D06C2F54}" dt="2025-11-07T10:29:47" v="458" actId="1076"/>
           <ac:spMkLst>
@@ -538,11 +424,19 @@
         </pc:spChg>
       </pc:sldChg>
       <pc:sldChg chg="modSp add mod">
-        <pc:chgData name="Miguel Rosalino" userId="142876607cca7130" providerId="LiveId" clId="{241F22B6-51C7-4BD9-87DD-DF73D06C2F54}" dt="2025-11-07T10:30:45.361" v="474" actId="166"/>
+        <pc:chgData name="Miguel Rosalino" userId="142876607cca7130" providerId="LiveId" clId="{241F22B6-51C7-4BD9-87DD-DF73D06C2F54}" dt="2025-11-13T16:40:41.329" v="501"/>
         <pc:sldMkLst>
           <pc:docMk/>
           <pc:sldMk cId="2911174203" sldId="281"/>
         </pc:sldMkLst>
+        <pc:spChg chg="mod">
+          <ac:chgData name="Miguel Rosalino" userId="142876607cca7130" providerId="LiveId" clId="{241F22B6-51C7-4BD9-87DD-DF73D06C2F54}" dt="2025-11-13T16:40:41.329" v="501"/>
+          <ac:spMkLst>
+            <pc:docMk/>
+            <pc:sldMk cId="2911174203" sldId="281"/>
+            <ac:spMk id="5" creationId="{10B03003-3C3C-5DEB-674B-549EA0D2F1D9}"/>
+          </ac:spMkLst>
+        </pc:spChg>
         <pc:spChg chg="mod ord">
           <ac:chgData name="Miguel Rosalino" userId="142876607cca7130" providerId="LiveId" clId="{241F22B6-51C7-4BD9-87DD-DF73D06C2F54}" dt="2025-11-07T10:30:40.388" v="472" actId="1035"/>
           <ac:spMkLst>
@@ -7874,7 +7768,43 @@
                 <a:cs typeface="Consolas"/>
                 <a:sym typeface="Consolas"/>
               </a:rPr>
-              <a:t>US 2: As an experienced player I think we should have a greater diversity of towers that can help us automate the way we defend order</a:t>
+              <a:t>US 2: As an experienced player I want to have a greater diversity of towers that can help</a:t>
+            </a:r>
+            <a:r>
+              <a:rPr lang="en-US" dirty="0">
+                <a:latin typeface="Consolas"/>
+                <a:ea typeface="Consolas"/>
+                <a:cs typeface="Consolas"/>
+                <a:sym typeface="Consolas"/>
+              </a:rPr>
+              <a:t> me</a:t>
+            </a:r>
+            <a:r>
+              <a:rPr lang="en-US" noProof="0" dirty="0">
+                <a:latin typeface="Consolas"/>
+                <a:ea typeface="Consolas"/>
+                <a:cs typeface="Consolas"/>
+                <a:sym typeface="Consolas"/>
+              </a:rPr>
+              <a:t> automate the way </a:t>
+            </a:r>
+            <a:r>
+              <a:rPr lang="en-US" dirty="0">
+                <a:latin typeface="Consolas"/>
+                <a:ea typeface="Consolas"/>
+                <a:cs typeface="Consolas"/>
+                <a:sym typeface="Consolas"/>
+              </a:rPr>
+              <a:t>I</a:t>
+            </a:r>
+            <a:r>
+              <a:rPr lang="en-US" noProof="0" dirty="0">
+                <a:latin typeface="Consolas"/>
+                <a:ea typeface="Consolas"/>
+                <a:cs typeface="Consolas"/>
+                <a:sym typeface="Consolas"/>
+              </a:rPr>
+              <a:t> defend orders.</a:t>
             </a:r>
           </a:p>
         </p:txBody>
@@ -9026,23 +8956,15 @@
           </a:bodyPr>
           <a:lstStyle/>
           <a:p>
-            <a:pPr marL="0" lvl="0" indent="0" algn="l" rtl="0">
-              <a:spcBef>
-                <a:spcPts val="0"/>
-              </a:spcBef>
-              <a:spcAft>
-                <a:spcPts val="0"/>
-              </a:spcAft>
-              <a:buNone/>
-            </a:pPr>
+            <a:pPr lvl="0"/>
             <a:r>
-              <a:rPr lang="en-US" noProof="0" dirty="0">
+              <a:rPr lang="en-US" dirty="0">
                 <a:latin typeface="Consolas"/>
                 <a:ea typeface="Consolas"/>
                 <a:cs typeface="Consolas"/>
                 <a:sym typeface="Consolas"/>
               </a:rPr>
-              <a:t>US 2: As an experienced player I think we should have a greater diversity of towers that can help us automate the way we defend order</a:t>
+              <a:t>US 2: As an experienced player I want to have a greater diversity of towers that can help me automate the way I defend orders.</a:t>
             </a:r>
           </a:p>
         </p:txBody>
@@ -10194,23 +10116,15 @@
           </a:bodyPr>
           <a:lstStyle/>
           <a:p>
-            <a:pPr marL="0" lvl="0" indent="0" algn="l" rtl="0">
-              <a:spcBef>
-                <a:spcPts val="0"/>
-              </a:spcBef>
-              <a:spcAft>
-                <a:spcPts val="0"/>
-              </a:spcAft>
-              <a:buNone/>
-            </a:pPr>
+            <a:pPr lvl="0"/>
             <a:r>
-              <a:rPr lang="en-US" noProof="0" dirty="0">
+              <a:rPr lang="en-US" dirty="0">
                 <a:latin typeface="Consolas"/>
                 <a:ea typeface="Consolas"/>
                 <a:cs typeface="Consolas"/>
                 <a:sym typeface="Consolas"/>
               </a:rPr>
-              <a:t>US 2: As an experienced player I think we should have a greater diversity of towers that can help us automate the way we defend order</a:t>
+              <a:t>US 2: As an experienced player I want to have a greater diversity of towers that can help me automate the way I defend orders.</a:t>
             </a:r>
           </a:p>
         </p:txBody>
@@ -11362,23 +11276,15 @@
           </a:bodyPr>
           <a:lstStyle/>
           <a:p>
-            <a:pPr marL="0" lvl="0" indent="0" algn="l" rtl="0">
-              <a:spcBef>
-                <a:spcPts val="0"/>
-              </a:spcBef>
-              <a:spcAft>
-                <a:spcPts val="0"/>
-              </a:spcAft>
-              <a:buNone/>
-            </a:pPr>
+            <a:pPr lvl="0"/>
             <a:r>
-              <a:rPr lang="en-US" noProof="0" dirty="0">
+              <a:rPr lang="en-US" dirty="0">
                 <a:latin typeface="Consolas"/>
                 <a:ea typeface="Consolas"/>
                 <a:cs typeface="Consolas"/>
                 <a:sym typeface="Consolas"/>
               </a:rPr>
-              <a:t>US 2: As an experienced player I think we should have a greater diversity of towers that can help us automate the way we defend order</a:t>
+              <a:t>US 2: As an experienced player I want to have a greater diversity of towers that can help me automate the way I defend orders.</a:t>
             </a:r>
           </a:p>
         </p:txBody>
@@ -12530,24 +12436,22 @@
           </a:bodyPr>
           <a:lstStyle/>
           <a:p>
-            <a:pPr marL="0" lvl="0" indent="0" algn="l" rtl="0">
-              <a:spcBef>
-                <a:spcPts val="0"/>
-              </a:spcBef>
-              <a:spcAft>
-                <a:spcPts val="0"/>
-              </a:spcAft>
-              <a:buNone/>
-            </a:pPr>
+            <a:pPr lvl="0"/>
             <a:r>
-              <a:rPr lang="en-US" noProof="0" dirty="0">
+              <a:rPr lang="en-US">
                 <a:latin typeface="Consolas"/>
                 <a:ea typeface="Consolas"/>
                 <a:cs typeface="Consolas"/>
                 <a:sym typeface="Consolas"/>
               </a:rPr>
-              <a:t>US 2: As an experienced player I think we should have a greater diversity of towers that can help us automate the way we defend order</a:t>
+              <a:t>US 2: As an experienced player I want to have a greater diversity of towers that can help me automate the way I defend orders.</a:t>
             </a:r>
+            <a:endParaRPr lang="en-US" dirty="0">
+              <a:latin typeface="Consolas"/>
+              <a:ea typeface="Consolas"/>
+              <a:cs typeface="Consolas"/>
+              <a:sym typeface="Consolas"/>
+            </a:endParaRPr>
           </a:p>
         </p:txBody>
       </p:sp>

</xml_diff>